<commit_message>
added the model debugging weights
</commit_message>
<xml_diff>
--- a/SummarySlide.pptx
+++ b/SummarySlide.pptx
@@ -128,12 +128,12 @@
   <pc:docChgLst>
     <pc:chgData name="me me" userId="7d25f9a69569e6b7" providerId="LiveId" clId="{F67D6249-4D5A-4A8F-828D-3E6BD3BE2515}"/>
     <pc:docChg chg="undo custSel modSld">
-      <pc:chgData name="me me" userId="7d25f9a69569e6b7" providerId="LiveId" clId="{F67D6249-4D5A-4A8F-828D-3E6BD3BE2515}" dt="2022-09-13T12:03:59.526" v="1943" actId="732"/>
+      <pc:chgData name="me me" userId="7d25f9a69569e6b7" providerId="LiveId" clId="{F67D6249-4D5A-4A8F-828D-3E6BD3BE2515}" dt="2022-09-13T14:19:28.302" v="1944" actId="1076"/>
       <pc:docMkLst>
         <pc:docMk/>
       </pc:docMkLst>
       <pc:sldChg chg="addSp delSp modSp mod">
-        <pc:chgData name="me me" userId="7d25f9a69569e6b7" providerId="LiveId" clId="{F67D6249-4D5A-4A8F-828D-3E6BD3BE2515}" dt="2022-09-13T12:03:59.526" v="1943" actId="732"/>
+        <pc:chgData name="me me" userId="7d25f9a69569e6b7" providerId="LiveId" clId="{F67D6249-4D5A-4A8F-828D-3E6BD3BE2515}" dt="2022-09-13T14:19:28.302" v="1944" actId="1076"/>
         <pc:sldMkLst>
           <pc:docMk/>
           <pc:sldMk cId="2268169008" sldId="256"/>
@@ -155,7 +155,7 @@
           </ac:spMkLst>
         </pc:spChg>
         <pc:spChg chg="mod">
-          <ac:chgData name="me me" userId="7d25f9a69569e6b7" providerId="LiveId" clId="{F67D6249-4D5A-4A8F-828D-3E6BD3BE2515}" dt="2022-09-13T12:02:49.803" v="1937" actId="207"/>
+          <ac:chgData name="me me" userId="7d25f9a69569e6b7" providerId="LiveId" clId="{F67D6249-4D5A-4A8F-828D-3E6BD3BE2515}" dt="2022-09-13T14:19:28.302" v="1944" actId="1076"/>
           <ac:spMkLst>
             <pc:docMk/>
             <pc:sldMk cId="2268169008" sldId="256"/>
@@ -3859,7 +3859,7 @@
         </p:nvSpPr>
         <p:spPr>
           <a:xfrm>
-            <a:off x="-2909" y="184575"/>
+            <a:off x="-2909" y="137922"/>
             <a:ext cx="6357018" cy="540753"/>
           </a:xfrm>
         </p:spPr>

</xml_diff>